<commit_message>
updated readmes, makefiles, ppt
</commit_message>
<xml_diff>
--- a/DockerReproducibility.pptx
+++ b/DockerReproducibility.pptx
@@ -212,7 +212,7 @@
           <a:p>
             <a:fld id="{1C215121-5046-43AB-8EA8-1A3E9A277562}" type="datetimeFigureOut">
               <a:rPr lang="en-CA" smtClean="0"/>
-              <a:t>2026-02-10</a:t>
+              <a:t>2026-02-11</a:t>
             </a:fld>
             <a:endParaRPr lang="en-CA"/>
           </a:p>
@@ -2180,7 +2180,7 @@
           <a:p>
             <a:fld id="{437C7F41-4DF2-4C13-A263-F7EFCB02805C}" type="datetime1">
               <a:rPr lang="en-CA" smtClean="0"/>
-              <a:t>2026-02-10</a:t>
+              <a:t>2026-02-11</a:t>
             </a:fld>
             <a:endParaRPr lang="en-CA"/>
           </a:p>
@@ -2388,7 +2388,7 @@
           <a:p>
             <a:fld id="{F3512542-28DB-415C-B2FC-DDDBE33EF89B}" type="datetime1">
               <a:rPr lang="en-CA" smtClean="0"/>
-              <a:t>2026-02-10</a:t>
+              <a:t>2026-02-11</a:t>
             </a:fld>
             <a:endParaRPr lang="en-CA"/>
           </a:p>
@@ -2644,7 +2644,7 @@
           <a:p>
             <a:fld id="{7841167D-EB4C-41EC-9214-B15E11A01503}" type="datetime1">
               <a:rPr lang="en-CA" smtClean="0"/>
-              <a:t>2026-02-10</a:t>
+              <a:t>2026-02-11</a:t>
             </a:fld>
             <a:endParaRPr lang="en-CA"/>
           </a:p>
@@ -2818,7 +2818,7 @@
           <a:p>
             <a:fld id="{0AA62F55-6C37-40E4-B8FD-EBAF1843B23F}" type="datetime1">
               <a:rPr lang="en-CA" smtClean="0"/>
-              <a:t>2026-02-10</a:t>
+              <a:t>2026-02-11</a:t>
             </a:fld>
             <a:endParaRPr lang="en-CA"/>
           </a:p>
@@ -3161,7 +3161,7 @@
           <a:p>
             <a:fld id="{AF2D3675-2710-433C-9F4B-0C40D98CAFA7}" type="datetime1">
               <a:rPr lang="en-CA" smtClean="0"/>
-              <a:t>2026-02-10</a:t>
+              <a:t>2026-02-11</a:t>
             </a:fld>
             <a:endParaRPr lang="en-CA"/>
           </a:p>
@@ -3436,7 +3436,7 @@
           <a:p>
             <a:fld id="{BD9AB373-D914-4231-A09E-FEA63DEC5DB0}" type="datetime1">
               <a:rPr lang="en-CA" smtClean="0"/>
-              <a:t>2026-02-10</a:t>
+              <a:t>2026-02-11</a:t>
             </a:fld>
             <a:endParaRPr lang="en-CA"/>
           </a:p>
@@ -3815,7 +3815,7 @@
           <a:p>
             <a:fld id="{953C1DA2-FE08-41FE-B275-51F91D7E85B4}" type="datetime1">
               <a:rPr lang="en-CA" smtClean="0"/>
-              <a:t>2026-02-10</a:t>
+              <a:t>2026-02-11</a:t>
             </a:fld>
             <a:endParaRPr lang="en-CA"/>
           </a:p>
@@ -3933,7 +3933,7 @@
           <a:p>
             <a:fld id="{A9052711-D3A2-4C27-BE53-EB1BD78206F9}" type="datetime1">
               <a:rPr lang="en-CA" smtClean="0"/>
-              <a:t>2026-02-10</a:t>
+              <a:t>2026-02-11</a:t>
             </a:fld>
             <a:endParaRPr lang="en-CA"/>
           </a:p>
@@ -4118,7 +4118,7 @@
           <a:p>
             <a:fld id="{6686315F-0055-46A4-BEB3-F1EEF9F4AE2C}" type="datetime1">
               <a:rPr lang="en-CA" smtClean="0"/>
-              <a:t>2026-02-10</a:t>
+              <a:t>2026-02-11</a:t>
             </a:fld>
             <a:endParaRPr lang="en-CA"/>
           </a:p>
@@ -4472,7 +4472,7 @@
           <a:p>
             <a:fld id="{DC36E748-7F80-465D-9602-1022BBB64038}" type="datetime1">
               <a:rPr lang="en-CA" smtClean="0"/>
-              <a:t>2026-02-10</a:t>
+              <a:t>2026-02-11</a:t>
             </a:fld>
             <a:endParaRPr lang="en-CA"/>
           </a:p>
@@ -4854,7 +4854,7 @@
           <a:p>
             <a:fld id="{CFD9D606-30C6-432B-892D-CF0242C2095C}" type="datetime1">
               <a:rPr lang="en-CA" smtClean="0"/>
-              <a:t>2026-02-10</a:t>
+              <a:t>2026-02-11</a:t>
             </a:fld>
             <a:endParaRPr lang="en-CA"/>
           </a:p>
@@ -5155,7 +5155,7 @@
           <a:p>
             <a:fld id="{DBD67A85-CDAD-44D1-BD4E-108A09642B2E}" type="datetime1">
               <a:rPr lang="en-CA" smtClean="0"/>
-              <a:t>2026-02-10</a:t>
+              <a:t>2026-02-11</a:t>
             </a:fld>
             <a:endParaRPr lang="en-CA"/>
           </a:p>
@@ -11109,7 +11109,7 @@
         <p:spPr>
           <a:xfrm>
             <a:off x="1371599" y="2318197"/>
-            <a:ext cx="9724031" cy="3683358"/>
+            <a:ext cx="9724031" cy="829449"/>
           </a:xfrm>
         </p:spPr>
         <p:txBody>
@@ -11118,6 +11118,24 @@
           </a:bodyPr>
           <a:lstStyle/>
           <a:p>
+            <a:pPr>
+              <a:buFont typeface="Wingdings" panose="05000000000000000000" pitchFamily="2" charset="2"/>
+              <a:buChar char="§"/>
+            </a:pPr>
+            <a:r>
+              <a:rPr lang="en-US" sz="2000" dirty="0"/>
+              <a:t> Slides + </a:t>
+            </a:r>
+            <a:r>
+              <a:rPr lang="en-US" dirty="0"/>
+              <a:t>Code found on: </a:t>
+            </a:r>
+            <a:r>
+              <a:rPr lang="en-US" dirty="0">
+                <a:hlinkClick r:id="rId3"/>
+              </a:rPr>
+              <a:t>https://github.com/UBCbioinformatics/DockerReproducibilityWorkshop</a:t>
+            </a:r>
             <a:endParaRPr lang="en-CA" sz="2000" dirty="0"/>
           </a:p>
         </p:txBody>

</xml_diff>

<commit_message>
added docker pull content
</commit_message>
<xml_diff>
--- a/DockerReproducibility.pptx
+++ b/DockerReproducibility.pptx
@@ -5,7 +5,7 @@
     <p:sldMasterId id="2147483804" r:id="rId1"/>
   </p:sldMasterIdLst>
   <p:notesMasterIdLst>
-    <p:notesMasterId r:id="rId18"/>
+    <p:notesMasterId r:id="rId19"/>
   </p:notesMasterIdLst>
   <p:sldIdLst>
     <p:sldId id="272" r:id="rId2"/>
@@ -18,12 +18,13 @@
     <p:sldId id="273" r:id="rId9"/>
     <p:sldId id="262" r:id="rId10"/>
     <p:sldId id="275" r:id="rId11"/>
-    <p:sldId id="269" r:id="rId12"/>
-    <p:sldId id="276" r:id="rId13"/>
-    <p:sldId id="277" r:id="rId14"/>
-    <p:sldId id="266" r:id="rId15"/>
-    <p:sldId id="267" r:id="rId16"/>
-    <p:sldId id="278" r:id="rId17"/>
+    <p:sldId id="280" r:id="rId12"/>
+    <p:sldId id="269" r:id="rId13"/>
+    <p:sldId id="276" r:id="rId14"/>
+    <p:sldId id="277" r:id="rId15"/>
+    <p:sldId id="266" r:id="rId16"/>
+    <p:sldId id="267" r:id="rId17"/>
+    <p:sldId id="278" r:id="rId18"/>
   </p:sldIdLst>
   <p:sldSz cx="12192000" cy="6858000"/>
   <p:notesSz cx="6858000" cy="9144000"/>
@@ -938,7 +939,7 @@
           <a:p>
             <a:fld id="{5197103A-E131-466A-83D3-C37A680AC1B3}" type="slidenum">
               <a:rPr lang="en-CA" smtClean="0"/>
-              <a:t>11</a:t>
+              <a:t>12</a:t>
             </a:fld>
             <a:endParaRPr lang="en-CA"/>
           </a:p>
@@ -6862,6 +6863,918 @@
 </file>
 
 <file path=ppt/slides/slide11.xml><?xml version="1.0" encoding="utf-8"?>
+<p:sld xmlns:a="http://schemas.openxmlformats.org/drawingml/2006/main" xmlns:r="http://schemas.openxmlformats.org/officeDocument/2006/relationships" xmlns:p="http://schemas.openxmlformats.org/presentationml/2006/main">
+  <p:cSld>
+    <p:spTree>
+      <p:nvGrpSpPr>
+        <p:cNvPr id="1" name=""/>
+        <p:cNvGrpSpPr/>
+        <p:nvPr/>
+      </p:nvGrpSpPr>
+      <p:grpSpPr>
+        <a:xfrm>
+          <a:off x="0" y="0"/>
+          <a:ext cx="0" cy="0"/>
+          <a:chOff x="0" y="0"/>
+          <a:chExt cx="0" cy="0"/>
+        </a:xfrm>
+      </p:grpSpPr>
+      <p:sp>
+        <p:nvSpPr>
+          <p:cNvPr id="2" name="Title 1">
+            <a:extLst>
+              <a:ext uri="{FF2B5EF4-FFF2-40B4-BE49-F238E27FC236}">
+                <a16:creationId xmlns:a16="http://schemas.microsoft.com/office/drawing/2014/main" id="{F0FCB828-9C6C-E475-1931-C59EEFB9C082}"/>
+              </a:ext>
+            </a:extLst>
+          </p:cNvPr>
+          <p:cNvSpPr>
+            <a:spLocks noGrp="1"/>
+          </p:cNvSpPr>
+          <p:nvPr>
+            <p:ph type="title"/>
+          </p:nvPr>
+        </p:nvSpPr>
+        <p:spPr/>
+        <p:txBody>
+          <a:bodyPr/>
+          <a:lstStyle/>
+          <a:p>
+            <a:r>
+              <a:rPr lang="en-US" sz="6000" dirty="0"/>
+              <a:t>Using</a:t>
+            </a:r>
+            <a:r>
+              <a:rPr lang="en-US" dirty="0"/>
+              <a:t> </a:t>
+            </a:r>
+            <a:r>
+              <a:rPr lang="en-US" sz="6000" dirty="0"/>
+              <a:t>Public Images</a:t>
+            </a:r>
+            <a:endParaRPr lang="en-CA" dirty="0"/>
+          </a:p>
+        </p:txBody>
+      </p:sp>
+      <p:sp>
+        <p:nvSpPr>
+          <p:cNvPr id="3" name="Content Placeholder 2">
+            <a:extLst>
+              <a:ext uri="{FF2B5EF4-FFF2-40B4-BE49-F238E27FC236}">
+                <a16:creationId xmlns:a16="http://schemas.microsoft.com/office/drawing/2014/main" id="{6185D4D9-46E4-6B76-5F83-103231E32D14}"/>
+              </a:ext>
+            </a:extLst>
+          </p:cNvPr>
+          <p:cNvSpPr txBox="1">
+            <a:spLocks/>
+          </p:cNvSpPr>
+          <p:nvPr/>
+        </p:nvSpPr>
+        <p:spPr>
+          <a:xfrm>
+            <a:off x="1319944" y="2001161"/>
+            <a:ext cx="9724031" cy="1033669"/>
+          </a:xfrm>
+          <a:prstGeom prst="rect">
+            <a:avLst/>
+          </a:prstGeom>
+        </p:spPr>
+        <p:txBody>
+          <a:bodyPr anchor="ctr">
+            <a:normAutofit lnSpcReduction="10000"/>
+          </a:bodyPr>
+          <a:lstStyle>
+            <a:lvl1pPr marL="91440" indent="-91440" algn="l" defTabSz="914400" rtl="0" eaLnBrk="1" latinLnBrk="0" hangingPunct="1">
+              <a:lnSpc>
+                <a:spcPct val="90000"/>
+              </a:lnSpc>
+              <a:spcBef>
+                <a:spcPts val="1200"/>
+              </a:spcBef>
+              <a:spcAft>
+                <a:spcPts val="200"/>
+              </a:spcAft>
+              <a:buClr>
+                <a:schemeClr val="accent1"/>
+              </a:buClr>
+              <a:buSzPct val="100000"/>
+              <a:buFont typeface="Calibri" panose="020F0502020204030204" pitchFamily="34" charset="0"/>
+              <a:buChar char=" "/>
+              <a:defRPr sz="2000" kern="1200">
+                <a:solidFill>
+                  <a:schemeClr val="tx1">
+                    <a:lumMod val="75000"/>
+                    <a:lumOff val="25000"/>
+                  </a:schemeClr>
+                </a:solidFill>
+                <a:latin typeface="+mn-lt"/>
+                <a:ea typeface="+mn-ea"/>
+                <a:cs typeface="+mn-cs"/>
+              </a:defRPr>
+            </a:lvl1pPr>
+            <a:lvl2pPr marL="384048" indent="-182880" algn="l" defTabSz="914400" rtl="0" eaLnBrk="1" latinLnBrk="0" hangingPunct="1">
+              <a:lnSpc>
+                <a:spcPct val="90000"/>
+              </a:lnSpc>
+              <a:spcBef>
+                <a:spcPts val="200"/>
+              </a:spcBef>
+              <a:spcAft>
+                <a:spcPts val="400"/>
+              </a:spcAft>
+              <a:buClr>
+                <a:schemeClr val="accent1"/>
+              </a:buClr>
+              <a:buFont typeface="Calibri" pitchFamily="34" charset="0"/>
+              <a:buChar char="◦"/>
+              <a:defRPr sz="1800" kern="1200">
+                <a:solidFill>
+                  <a:schemeClr val="tx1">
+                    <a:lumMod val="75000"/>
+                    <a:lumOff val="25000"/>
+                  </a:schemeClr>
+                </a:solidFill>
+                <a:latin typeface="+mn-lt"/>
+                <a:ea typeface="+mn-ea"/>
+                <a:cs typeface="+mn-cs"/>
+              </a:defRPr>
+            </a:lvl2pPr>
+            <a:lvl3pPr marL="566928" indent="-182880" algn="l" defTabSz="914400" rtl="0" eaLnBrk="1" latinLnBrk="0" hangingPunct="1">
+              <a:lnSpc>
+                <a:spcPct val="90000"/>
+              </a:lnSpc>
+              <a:spcBef>
+                <a:spcPts val="200"/>
+              </a:spcBef>
+              <a:spcAft>
+                <a:spcPts val="400"/>
+              </a:spcAft>
+              <a:buClr>
+                <a:schemeClr val="accent1"/>
+              </a:buClr>
+              <a:buFont typeface="Calibri" pitchFamily="34" charset="0"/>
+              <a:buChar char="◦"/>
+              <a:defRPr sz="1400" kern="1200">
+                <a:solidFill>
+                  <a:schemeClr val="tx1">
+                    <a:lumMod val="75000"/>
+                    <a:lumOff val="25000"/>
+                  </a:schemeClr>
+                </a:solidFill>
+                <a:latin typeface="+mn-lt"/>
+                <a:ea typeface="+mn-ea"/>
+                <a:cs typeface="+mn-cs"/>
+              </a:defRPr>
+            </a:lvl3pPr>
+            <a:lvl4pPr marL="749808" indent="-182880" algn="l" defTabSz="914400" rtl="0" eaLnBrk="1" latinLnBrk="0" hangingPunct="1">
+              <a:lnSpc>
+                <a:spcPct val="90000"/>
+              </a:lnSpc>
+              <a:spcBef>
+                <a:spcPts val="200"/>
+              </a:spcBef>
+              <a:spcAft>
+                <a:spcPts val="400"/>
+              </a:spcAft>
+              <a:buClr>
+                <a:schemeClr val="accent1"/>
+              </a:buClr>
+              <a:buFont typeface="Calibri" pitchFamily="34" charset="0"/>
+              <a:buChar char="◦"/>
+              <a:defRPr sz="1400" kern="1200">
+                <a:solidFill>
+                  <a:schemeClr val="tx1">
+                    <a:lumMod val="75000"/>
+                    <a:lumOff val="25000"/>
+                  </a:schemeClr>
+                </a:solidFill>
+                <a:latin typeface="+mn-lt"/>
+                <a:ea typeface="+mn-ea"/>
+                <a:cs typeface="+mn-cs"/>
+              </a:defRPr>
+            </a:lvl4pPr>
+            <a:lvl5pPr marL="932688" indent="-182880" algn="l" defTabSz="914400" rtl="0" eaLnBrk="1" latinLnBrk="0" hangingPunct="1">
+              <a:lnSpc>
+                <a:spcPct val="90000"/>
+              </a:lnSpc>
+              <a:spcBef>
+                <a:spcPts val="200"/>
+              </a:spcBef>
+              <a:spcAft>
+                <a:spcPts val="400"/>
+              </a:spcAft>
+              <a:buClr>
+                <a:schemeClr val="accent1"/>
+              </a:buClr>
+              <a:buFont typeface="Calibri" pitchFamily="34" charset="0"/>
+              <a:buChar char="◦"/>
+              <a:defRPr sz="1400" kern="1200">
+                <a:solidFill>
+                  <a:schemeClr val="tx1">
+                    <a:lumMod val="75000"/>
+                    <a:lumOff val="25000"/>
+                  </a:schemeClr>
+                </a:solidFill>
+                <a:latin typeface="+mn-lt"/>
+                <a:ea typeface="+mn-ea"/>
+                <a:cs typeface="+mn-cs"/>
+              </a:defRPr>
+            </a:lvl5pPr>
+            <a:lvl6pPr marL="1100000" indent="-228600" algn="l" defTabSz="914400" rtl="0" eaLnBrk="1" latinLnBrk="0" hangingPunct="1">
+              <a:lnSpc>
+                <a:spcPct val="90000"/>
+              </a:lnSpc>
+              <a:spcBef>
+                <a:spcPts val="200"/>
+              </a:spcBef>
+              <a:spcAft>
+                <a:spcPts val="400"/>
+              </a:spcAft>
+              <a:buClr>
+                <a:schemeClr val="accent1"/>
+              </a:buClr>
+              <a:buFont typeface="Calibri" pitchFamily="34" charset="0"/>
+              <a:buChar char="◦"/>
+              <a:defRPr sz="1400" kern="1200">
+                <a:solidFill>
+                  <a:schemeClr val="tx1">
+                    <a:lumMod val="75000"/>
+                    <a:lumOff val="25000"/>
+                  </a:schemeClr>
+                </a:solidFill>
+                <a:latin typeface="+mn-lt"/>
+                <a:ea typeface="+mn-ea"/>
+                <a:cs typeface="+mn-cs"/>
+              </a:defRPr>
+            </a:lvl6pPr>
+            <a:lvl7pPr marL="1300000" indent="-228600" algn="l" defTabSz="914400" rtl="0" eaLnBrk="1" latinLnBrk="0" hangingPunct="1">
+              <a:lnSpc>
+                <a:spcPct val="90000"/>
+              </a:lnSpc>
+              <a:spcBef>
+                <a:spcPts val="200"/>
+              </a:spcBef>
+              <a:spcAft>
+                <a:spcPts val="400"/>
+              </a:spcAft>
+              <a:buClr>
+                <a:schemeClr val="accent1"/>
+              </a:buClr>
+              <a:buFont typeface="Calibri" pitchFamily="34" charset="0"/>
+              <a:buChar char="◦"/>
+              <a:defRPr sz="1400" kern="1200">
+                <a:solidFill>
+                  <a:schemeClr val="tx1">
+                    <a:lumMod val="75000"/>
+                    <a:lumOff val="25000"/>
+                  </a:schemeClr>
+                </a:solidFill>
+                <a:latin typeface="+mn-lt"/>
+                <a:ea typeface="+mn-ea"/>
+                <a:cs typeface="+mn-cs"/>
+              </a:defRPr>
+            </a:lvl7pPr>
+            <a:lvl8pPr marL="1500000" indent="-228600" algn="l" defTabSz="914400" rtl="0" eaLnBrk="1" latinLnBrk="0" hangingPunct="1">
+              <a:lnSpc>
+                <a:spcPct val="90000"/>
+              </a:lnSpc>
+              <a:spcBef>
+                <a:spcPts val="200"/>
+              </a:spcBef>
+              <a:spcAft>
+                <a:spcPts val="400"/>
+              </a:spcAft>
+              <a:buClr>
+                <a:schemeClr val="accent1"/>
+              </a:buClr>
+              <a:buFont typeface="Calibri" pitchFamily="34" charset="0"/>
+              <a:buChar char="◦"/>
+              <a:defRPr sz="1400" kern="1200">
+                <a:solidFill>
+                  <a:schemeClr val="tx1">
+                    <a:lumMod val="75000"/>
+                    <a:lumOff val="25000"/>
+                  </a:schemeClr>
+                </a:solidFill>
+                <a:latin typeface="+mn-lt"/>
+                <a:ea typeface="+mn-ea"/>
+                <a:cs typeface="+mn-cs"/>
+              </a:defRPr>
+            </a:lvl8pPr>
+            <a:lvl9pPr marL="1700000" indent="-228600" algn="l" defTabSz="914400" rtl="0" eaLnBrk="1" latinLnBrk="0" hangingPunct="1">
+              <a:lnSpc>
+                <a:spcPct val="90000"/>
+              </a:lnSpc>
+              <a:spcBef>
+                <a:spcPts val="200"/>
+              </a:spcBef>
+              <a:spcAft>
+                <a:spcPts val="400"/>
+              </a:spcAft>
+              <a:buClr>
+                <a:schemeClr val="accent1"/>
+              </a:buClr>
+              <a:buFont typeface="Calibri" pitchFamily="34" charset="0"/>
+              <a:buChar char="◦"/>
+              <a:defRPr sz="1400" kern="1200">
+                <a:solidFill>
+                  <a:schemeClr val="tx1">
+                    <a:lumMod val="75000"/>
+                    <a:lumOff val="25000"/>
+                  </a:schemeClr>
+                </a:solidFill>
+                <a:latin typeface="+mn-lt"/>
+                <a:ea typeface="+mn-ea"/>
+                <a:cs typeface="+mn-cs"/>
+              </a:defRPr>
+            </a:lvl9pPr>
+          </a:lstStyle>
+          <a:p>
+            <a:pPr>
+              <a:buFont typeface="Wingdings" panose="05000000000000000000" pitchFamily="2" charset="2"/>
+              <a:buChar char="§"/>
+            </a:pPr>
+            <a:r>
+              <a:rPr lang="en-US" dirty="0"/>
+              <a:t> Rather than compiling your own images from scratch: can use public images from </a:t>
+            </a:r>
+            <a:r>
+              <a:rPr lang="en-US" dirty="0" err="1">
+                <a:hlinkClick r:id="rId2"/>
+              </a:rPr>
+              <a:t>DockerHub</a:t>
+            </a:r>
+            <a:endParaRPr lang="en-US" dirty="0"/>
+          </a:p>
+          <a:p>
+            <a:pPr>
+              <a:buFont typeface="Wingdings" panose="05000000000000000000" pitchFamily="2" charset="2"/>
+              <a:buChar char="§"/>
+            </a:pPr>
+            <a:r>
+              <a:rPr lang="en-CA" dirty="0"/>
+              <a:t> Use this command:</a:t>
+            </a:r>
+          </a:p>
+        </p:txBody>
+      </p:sp>
+      <p:sp>
+        <p:nvSpPr>
+          <p:cNvPr id="5" name="TextBox 4">
+            <a:extLst>
+              <a:ext uri="{FF2B5EF4-FFF2-40B4-BE49-F238E27FC236}">
+                <a16:creationId xmlns:a16="http://schemas.microsoft.com/office/drawing/2014/main" id="{028B06A9-1046-EBB0-FB31-0E0E23339D24}"/>
+              </a:ext>
+            </a:extLst>
+          </p:cNvPr>
+          <p:cNvSpPr txBox="1"/>
+          <p:nvPr/>
+        </p:nvSpPr>
+        <p:spPr>
+          <a:xfrm>
+            <a:off x="1889429" y="3429000"/>
+            <a:ext cx="8413141" cy="292965"/>
+          </a:xfrm>
+          <a:prstGeom prst="rect">
+            <a:avLst/>
+          </a:prstGeom>
+          <a:noFill/>
+        </p:spPr>
+        <p:txBody>
+          <a:bodyPr wrap="square">
+            <a:spAutoFit/>
+          </a:bodyPr>
+          <a:lstStyle/>
+          <a:p>
+            <a:pPr>
+              <a:lnSpc>
+                <a:spcPts val="1425"/>
+              </a:lnSpc>
+              <a:buNone/>
+            </a:pPr>
+            <a:r>
+              <a:rPr lang="en-US" sz="2000" b="0" dirty="0">
+                <a:solidFill>
+                  <a:srgbClr val="000000"/>
+                </a:solidFill>
+                <a:effectLst/>
+                <a:latin typeface="Consolas" panose="020B0609020204030204" pitchFamily="49" charset="0"/>
+              </a:rPr>
+              <a:t>docker pull [</a:t>
+            </a:r>
+            <a:r>
+              <a:rPr lang="en-US" sz="2000" b="0" dirty="0">
+                <a:solidFill>
+                  <a:srgbClr val="A31515"/>
+                </a:solidFill>
+                <a:effectLst/>
+                <a:latin typeface="Consolas" panose="020B0609020204030204" pitchFamily="49" charset="0"/>
+              </a:rPr>
+              <a:t>NAME_OF_REPO</a:t>
+            </a:r>
+            <a:r>
+              <a:rPr lang="en-US" sz="2000" b="0" dirty="0">
+                <a:solidFill>
+                  <a:srgbClr val="000000"/>
+                </a:solidFill>
+                <a:effectLst/>
+                <a:latin typeface="Consolas" panose="020B0609020204030204" pitchFamily="49" charset="0"/>
+              </a:rPr>
+              <a:t>]/[</a:t>
+            </a:r>
+            <a:r>
+              <a:rPr lang="en-US" sz="2000" b="0" dirty="0">
+                <a:solidFill>
+                  <a:srgbClr val="A31515"/>
+                </a:solidFill>
+                <a:effectLst/>
+                <a:latin typeface="Consolas" panose="020B0609020204030204" pitchFamily="49" charset="0"/>
+              </a:rPr>
+              <a:t>NAME_OF_IMAGE</a:t>
+            </a:r>
+            <a:r>
+              <a:rPr lang="en-US" sz="2000" b="0" dirty="0">
+                <a:solidFill>
+                  <a:srgbClr val="000000"/>
+                </a:solidFill>
+                <a:effectLst/>
+                <a:latin typeface="Consolas" panose="020B0609020204030204" pitchFamily="49" charset="0"/>
+              </a:rPr>
+              <a:t>]:[</a:t>
+            </a:r>
+            <a:r>
+              <a:rPr lang="en-US" sz="2000" b="0" dirty="0">
+                <a:solidFill>
+                  <a:srgbClr val="A31515"/>
+                </a:solidFill>
+                <a:effectLst/>
+                <a:latin typeface="Consolas" panose="020B0609020204030204" pitchFamily="49" charset="0"/>
+              </a:rPr>
+              <a:t>TAG_VERSION</a:t>
+            </a:r>
+            <a:r>
+              <a:rPr lang="en-US" sz="2000" b="0" dirty="0">
+                <a:solidFill>
+                  <a:srgbClr val="000000"/>
+                </a:solidFill>
+                <a:effectLst/>
+                <a:latin typeface="Consolas" panose="020B0609020204030204" pitchFamily="49" charset="0"/>
+              </a:rPr>
+              <a:t>]</a:t>
+            </a:r>
+          </a:p>
+        </p:txBody>
+      </p:sp>
+      <p:pic>
+        <p:nvPicPr>
+          <p:cNvPr id="7" name="Picture 6">
+            <a:extLst>
+              <a:ext uri="{FF2B5EF4-FFF2-40B4-BE49-F238E27FC236}">
+                <a16:creationId xmlns:a16="http://schemas.microsoft.com/office/drawing/2014/main" id="{36484350-9B88-D64E-46C1-92DC29F47715}"/>
+              </a:ext>
+            </a:extLst>
+          </p:cNvPr>
+          <p:cNvPicPr>
+            <a:picLocks noChangeAspect="1"/>
+          </p:cNvPicPr>
+          <p:nvPr/>
+        </p:nvPicPr>
+        <p:blipFill>
+          <a:blip r:embed="rId3"/>
+          <a:stretch>
+            <a:fillRect/>
+          </a:stretch>
+        </p:blipFill>
+        <p:spPr>
+          <a:xfrm>
+            <a:off x="9665771" y="286603"/>
+            <a:ext cx="1428949" cy="1152686"/>
+          </a:xfrm>
+          <a:prstGeom prst="rect">
+            <a:avLst/>
+          </a:prstGeom>
+        </p:spPr>
+      </p:pic>
+      <p:sp>
+        <p:nvSpPr>
+          <p:cNvPr id="9" name="Content Placeholder 2">
+            <a:extLst>
+              <a:ext uri="{FF2B5EF4-FFF2-40B4-BE49-F238E27FC236}">
+                <a16:creationId xmlns:a16="http://schemas.microsoft.com/office/drawing/2014/main" id="{A0B384A6-4950-3246-3747-C1C3C7D28783}"/>
+              </a:ext>
+            </a:extLst>
+          </p:cNvPr>
+          <p:cNvSpPr txBox="1">
+            <a:spLocks/>
+          </p:cNvSpPr>
+          <p:nvPr/>
+        </p:nvSpPr>
+        <p:spPr>
+          <a:xfrm>
+            <a:off x="1319944" y="3963735"/>
+            <a:ext cx="9724031" cy="1033669"/>
+          </a:xfrm>
+          <a:prstGeom prst="rect">
+            <a:avLst/>
+          </a:prstGeom>
+        </p:spPr>
+        <p:txBody>
+          <a:bodyPr anchor="ctr">
+            <a:normAutofit/>
+          </a:bodyPr>
+          <a:lstStyle>
+            <a:lvl1pPr marL="91440" indent="-91440" algn="l" defTabSz="914400" rtl="0" eaLnBrk="1" latinLnBrk="0" hangingPunct="1">
+              <a:lnSpc>
+                <a:spcPct val="90000"/>
+              </a:lnSpc>
+              <a:spcBef>
+                <a:spcPts val="1200"/>
+              </a:spcBef>
+              <a:spcAft>
+                <a:spcPts val="200"/>
+              </a:spcAft>
+              <a:buClr>
+                <a:schemeClr val="accent1"/>
+              </a:buClr>
+              <a:buSzPct val="100000"/>
+              <a:buFont typeface="Calibri" panose="020F0502020204030204" pitchFamily="34" charset="0"/>
+              <a:buChar char=" "/>
+              <a:defRPr sz="2000" kern="1200">
+                <a:solidFill>
+                  <a:schemeClr val="tx1">
+                    <a:lumMod val="75000"/>
+                    <a:lumOff val="25000"/>
+                  </a:schemeClr>
+                </a:solidFill>
+                <a:latin typeface="+mn-lt"/>
+                <a:ea typeface="+mn-ea"/>
+                <a:cs typeface="+mn-cs"/>
+              </a:defRPr>
+            </a:lvl1pPr>
+            <a:lvl2pPr marL="384048" indent="-182880" algn="l" defTabSz="914400" rtl="0" eaLnBrk="1" latinLnBrk="0" hangingPunct="1">
+              <a:lnSpc>
+                <a:spcPct val="90000"/>
+              </a:lnSpc>
+              <a:spcBef>
+                <a:spcPts val="200"/>
+              </a:spcBef>
+              <a:spcAft>
+                <a:spcPts val="400"/>
+              </a:spcAft>
+              <a:buClr>
+                <a:schemeClr val="accent1"/>
+              </a:buClr>
+              <a:buFont typeface="Calibri" pitchFamily="34" charset="0"/>
+              <a:buChar char="◦"/>
+              <a:defRPr sz="1800" kern="1200">
+                <a:solidFill>
+                  <a:schemeClr val="tx1">
+                    <a:lumMod val="75000"/>
+                    <a:lumOff val="25000"/>
+                  </a:schemeClr>
+                </a:solidFill>
+                <a:latin typeface="+mn-lt"/>
+                <a:ea typeface="+mn-ea"/>
+                <a:cs typeface="+mn-cs"/>
+              </a:defRPr>
+            </a:lvl2pPr>
+            <a:lvl3pPr marL="566928" indent="-182880" algn="l" defTabSz="914400" rtl="0" eaLnBrk="1" latinLnBrk="0" hangingPunct="1">
+              <a:lnSpc>
+                <a:spcPct val="90000"/>
+              </a:lnSpc>
+              <a:spcBef>
+                <a:spcPts val="200"/>
+              </a:spcBef>
+              <a:spcAft>
+                <a:spcPts val="400"/>
+              </a:spcAft>
+              <a:buClr>
+                <a:schemeClr val="accent1"/>
+              </a:buClr>
+              <a:buFont typeface="Calibri" pitchFamily="34" charset="0"/>
+              <a:buChar char="◦"/>
+              <a:defRPr sz="1400" kern="1200">
+                <a:solidFill>
+                  <a:schemeClr val="tx1">
+                    <a:lumMod val="75000"/>
+                    <a:lumOff val="25000"/>
+                  </a:schemeClr>
+                </a:solidFill>
+                <a:latin typeface="+mn-lt"/>
+                <a:ea typeface="+mn-ea"/>
+                <a:cs typeface="+mn-cs"/>
+              </a:defRPr>
+            </a:lvl3pPr>
+            <a:lvl4pPr marL="749808" indent="-182880" algn="l" defTabSz="914400" rtl="0" eaLnBrk="1" latinLnBrk="0" hangingPunct="1">
+              <a:lnSpc>
+                <a:spcPct val="90000"/>
+              </a:lnSpc>
+              <a:spcBef>
+                <a:spcPts val="200"/>
+              </a:spcBef>
+              <a:spcAft>
+                <a:spcPts val="400"/>
+              </a:spcAft>
+              <a:buClr>
+                <a:schemeClr val="accent1"/>
+              </a:buClr>
+              <a:buFont typeface="Calibri" pitchFamily="34" charset="0"/>
+              <a:buChar char="◦"/>
+              <a:defRPr sz="1400" kern="1200">
+                <a:solidFill>
+                  <a:schemeClr val="tx1">
+                    <a:lumMod val="75000"/>
+                    <a:lumOff val="25000"/>
+                  </a:schemeClr>
+                </a:solidFill>
+                <a:latin typeface="+mn-lt"/>
+                <a:ea typeface="+mn-ea"/>
+                <a:cs typeface="+mn-cs"/>
+              </a:defRPr>
+            </a:lvl4pPr>
+            <a:lvl5pPr marL="932688" indent="-182880" algn="l" defTabSz="914400" rtl="0" eaLnBrk="1" latinLnBrk="0" hangingPunct="1">
+              <a:lnSpc>
+                <a:spcPct val="90000"/>
+              </a:lnSpc>
+              <a:spcBef>
+                <a:spcPts val="200"/>
+              </a:spcBef>
+              <a:spcAft>
+                <a:spcPts val="400"/>
+              </a:spcAft>
+              <a:buClr>
+                <a:schemeClr val="accent1"/>
+              </a:buClr>
+              <a:buFont typeface="Calibri" pitchFamily="34" charset="0"/>
+              <a:buChar char="◦"/>
+              <a:defRPr sz="1400" kern="1200">
+                <a:solidFill>
+                  <a:schemeClr val="tx1">
+                    <a:lumMod val="75000"/>
+                    <a:lumOff val="25000"/>
+                  </a:schemeClr>
+                </a:solidFill>
+                <a:latin typeface="+mn-lt"/>
+                <a:ea typeface="+mn-ea"/>
+                <a:cs typeface="+mn-cs"/>
+              </a:defRPr>
+            </a:lvl5pPr>
+            <a:lvl6pPr marL="1100000" indent="-228600" algn="l" defTabSz="914400" rtl="0" eaLnBrk="1" latinLnBrk="0" hangingPunct="1">
+              <a:lnSpc>
+                <a:spcPct val="90000"/>
+              </a:lnSpc>
+              <a:spcBef>
+                <a:spcPts val="200"/>
+              </a:spcBef>
+              <a:spcAft>
+                <a:spcPts val="400"/>
+              </a:spcAft>
+              <a:buClr>
+                <a:schemeClr val="accent1"/>
+              </a:buClr>
+              <a:buFont typeface="Calibri" pitchFamily="34" charset="0"/>
+              <a:buChar char="◦"/>
+              <a:defRPr sz="1400" kern="1200">
+                <a:solidFill>
+                  <a:schemeClr val="tx1">
+                    <a:lumMod val="75000"/>
+                    <a:lumOff val="25000"/>
+                  </a:schemeClr>
+                </a:solidFill>
+                <a:latin typeface="+mn-lt"/>
+                <a:ea typeface="+mn-ea"/>
+                <a:cs typeface="+mn-cs"/>
+              </a:defRPr>
+            </a:lvl6pPr>
+            <a:lvl7pPr marL="1300000" indent="-228600" algn="l" defTabSz="914400" rtl="0" eaLnBrk="1" latinLnBrk="0" hangingPunct="1">
+              <a:lnSpc>
+                <a:spcPct val="90000"/>
+              </a:lnSpc>
+              <a:spcBef>
+                <a:spcPts val="200"/>
+              </a:spcBef>
+              <a:spcAft>
+                <a:spcPts val="400"/>
+              </a:spcAft>
+              <a:buClr>
+                <a:schemeClr val="accent1"/>
+              </a:buClr>
+              <a:buFont typeface="Calibri" pitchFamily="34" charset="0"/>
+              <a:buChar char="◦"/>
+              <a:defRPr sz="1400" kern="1200">
+                <a:solidFill>
+                  <a:schemeClr val="tx1">
+                    <a:lumMod val="75000"/>
+                    <a:lumOff val="25000"/>
+                  </a:schemeClr>
+                </a:solidFill>
+                <a:latin typeface="+mn-lt"/>
+                <a:ea typeface="+mn-ea"/>
+                <a:cs typeface="+mn-cs"/>
+              </a:defRPr>
+            </a:lvl7pPr>
+            <a:lvl8pPr marL="1500000" indent="-228600" algn="l" defTabSz="914400" rtl="0" eaLnBrk="1" latinLnBrk="0" hangingPunct="1">
+              <a:lnSpc>
+                <a:spcPct val="90000"/>
+              </a:lnSpc>
+              <a:spcBef>
+                <a:spcPts val="200"/>
+              </a:spcBef>
+              <a:spcAft>
+                <a:spcPts val="400"/>
+              </a:spcAft>
+              <a:buClr>
+                <a:schemeClr val="accent1"/>
+              </a:buClr>
+              <a:buFont typeface="Calibri" pitchFamily="34" charset="0"/>
+              <a:buChar char="◦"/>
+              <a:defRPr sz="1400" kern="1200">
+                <a:solidFill>
+                  <a:schemeClr val="tx1">
+                    <a:lumMod val="75000"/>
+                    <a:lumOff val="25000"/>
+                  </a:schemeClr>
+                </a:solidFill>
+                <a:latin typeface="+mn-lt"/>
+                <a:ea typeface="+mn-ea"/>
+                <a:cs typeface="+mn-cs"/>
+              </a:defRPr>
+            </a:lvl8pPr>
+            <a:lvl9pPr marL="1700000" indent="-228600" algn="l" defTabSz="914400" rtl="0" eaLnBrk="1" latinLnBrk="0" hangingPunct="1">
+              <a:lnSpc>
+                <a:spcPct val="90000"/>
+              </a:lnSpc>
+              <a:spcBef>
+                <a:spcPts val="200"/>
+              </a:spcBef>
+              <a:spcAft>
+                <a:spcPts val="400"/>
+              </a:spcAft>
+              <a:buClr>
+                <a:schemeClr val="accent1"/>
+              </a:buClr>
+              <a:buFont typeface="Calibri" pitchFamily="34" charset="0"/>
+              <a:buChar char="◦"/>
+              <a:defRPr sz="1400" kern="1200">
+                <a:solidFill>
+                  <a:schemeClr val="tx1">
+                    <a:lumMod val="75000"/>
+                    <a:lumOff val="25000"/>
+                  </a:schemeClr>
+                </a:solidFill>
+                <a:latin typeface="+mn-lt"/>
+                <a:ea typeface="+mn-ea"/>
+                <a:cs typeface="+mn-cs"/>
+              </a:defRPr>
+            </a:lvl9pPr>
+          </a:lstStyle>
+          <a:p>
+            <a:pPr>
+              <a:buFont typeface="Wingdings" panose="05000000000000000000" pitchFamily="2" charset="2"/>
+              <a:buChar char="§"/>
+            </a:pPr>
+            <a:r>
+              <a:rPr lang="en-US" dirty="0"/>
+              <a:t> To share an image you’ve created: </a:t>
+            </a:r>
+            <a:endParaRPr lang="en-CA" dirty="0"/>
+          </a:p>
+        </p:txBody>
+      </p:sp>
+      <p:sp>
+        <p:nvSpPr>
+          <p:cNvPr id="10" name="TextBox 9">
+            <a:extLst>
+              <a:ext uri="{FF2B5EF4-FFF2-40B4-BE49-F238E27FC236}">
+                <a16:creationId xmlns:a16="http://schemas.microsoft.com/office/drawing/2014/main" id="{4E2B9455-A074-3E71-2DD1-E1EAA8885F88}"/>
+              </a:ext>
+            </a:extLst>
+          </p:cNvPr>
+          <p:cNvSpPr txBox="1"/>
+          <p:nvPr/>
+        </p:nvSpPr>
+        <p:spPr>
+          <a:xfrm>
+            <a:off x="1319944" y="4997404"/>
+            <a:ext cx="9205289" cy="292965"/>
+          </a:xfrm>
+          <a:prstGeom prst="rect">
+            <a:avLst/>
+          </a:prstGeom>
+          <a:noFill/>
+        </p:spPr>
+        <p:txBody>
+          <a:bodyPr wrap="square">
+            <a:spAutoFit/>
+          </a:bodyPr>
+          <a:lstStyle/>
+          <a:p>
+            <a:pPr>
+              <a:lnSpc>
+                <a:spcPts val="1425"/>
+              </a:lnSpc>
+              <a:buNone/>
+            </a:pPr>
+            <a:r>
+              <a:rPr lang="en-US" sz="2000" b="0" dirty="0">
+                <a:solidFill>
+                  <a:srgbClr val="000000"/>
+                </a:solidFill>
+                <a:effectLst/>
+                <a:latin typeface="Consolas" panose="020B0609020204030204" pitchFamily="49" charset="0"/>
+              </a:rPr>
+              <a:t>docker pu</a:t>
+            </a:r>
+            <a:r>
+              <a:rPr lang="en-US" sz="2000" dirty="0">
+                <a:solidFill>
+                  <a:srgbClr val="000000"/>
+                </a:solidFill>
+                <a:latin typeface="Consolas" panose="020B0609020204030204" pitchFamily="49" charset="0"/>
+              </a:rPr>
+              <a:t>sh [</a:t>
+            </a:r>
+            <a:r>
+              <a:rPr lang="en-US" sz="2000" dirty="0">
+                <a:solidFill>
+                  <a:srgbClr val="A31515"/>
+                </a:solidFill>
+                <a:latin typeface="Consolas" panose="020B0609020204030204" pitchFamily="49" charset="0"/>
+              </a:rPr>
+              <a:t>YOUR_DOCKER_USERNAME</a:t>
+            </a:r>
+            <a:r>
+              <a:rPr lang="en-US" sz="2000" dirty="0">
+                <a:solidFill>
+                  <a:srgbClr val="000000"/>
+                </a:solidFill>
+                <a:latin typeface="Consolas" panose="020B0609020204030204" pitchFamily="49" charset="0"/>
+              </a:rPr>
+              <a:t>]/[</a:t>
+            </a:r>
+            <a:r>
+              <a:rPr lang="en-US" sz="2000" dirty="0">
+                <a:solidFill>
+                  <a:srgbClr val="A31515"/>
+                </a:solidFill>
+                <a:latin typeface="Consolas" panose="020B0609020204030204" pitchFamily="49" charset="0"/>
+              </a:rPr>
+              <a:t>NAME_OF_IMAGE</a:t>
+            </a:r>
+            <a:r>
+              <a:rPr lang="en-US" sz="2000" dirty="0">
+                <a:solidFill>
+                  <a:srgbClr val="000000"/>
+                </a:solidFill>
+                <a:latin typeface="Consolas" panose="020B0609020204030204" pitchFamily="49" charset="0"/>
+              </a:rPr>
+              <a:t>]:[</a:t>
+            </a:r>
+            <a:r>
+              <a:rPr lang="en-US" sz="2000" dirty="0">
+                <a:solidFill>
+                  <a:srgbClr val="A31515"/>
+                </a:solidFill>
+                <a:latin typeface="Consolas" panose="020B0609020204030204" pitchFamily="49" charset="0"/>
+              </a:rPr>
+              <a:t>TAG_VERSION</a:t>
+            </a:r>
+            <a:r>
+              <a:rPr lang="en-US" sz="2000" dirty="0">
+                <a:solidFill>
+                  <a:srgbClr val="000000"/>
+                </a:solidFill>
+                <a:latin typeface="Consolas" panose="020B0609020204030204" pitchFamily="49" charset="0"/>
+              </a:rPr>
+              <a:t>]</a:t>
+            </a:r>
+            <a:r>
+              <a:rPr lang="en-US" sz="2000" b="0" dirty="0">
+                <a:solidFill>
+                  <a:srgbClr val="000000"/>
+                </a:solidFill>
+                <a:effectLst/>
+                <a:latin typeface="Consolas" panose="020B0609020204030204" pitchFamily="49" charset="0"/>
+              </a:rPr>
+              <a:t> </a:t>
+            </a:r>
+          </a:p>
+        </p:txBody>
+      </p:sp>
+    </p:spTree>
+    <p:extLst>
+      <p:ext uri="{BB962C8B-B14F-4D97-AF65-F5344CB8AC3E}">
+        <p14:creationId xmlns:p14="http://schemas.microsoft.com/office/powerpoint/2010/main" val="2136986344"/>
+      </p:ext>
+    </p:extLst>
+  </p:cSld>
+  <p:clrMapOvr>
+    <a:masterClrMapping/>
+  </p:clrMapOvr>
+</p:sld>
+</file>
+
+<file path=ppt/slides/slide12.xml><?xml version="1.0" encoding="utf-8"?>
 <p:sld xmlns:a="http://schemas.openxmlformats.org/drawingml/2006/main" xmlns:r="http://schemas.openxmlformats.org/officeDocument/2006/relationships" xmlns:p="http://schemas.openxmlformats.org/presentationml/2006/main">
   <p:cSld>
     <p:bg>
@@ -8912,7 +9825,7 @@
 </p:sld>
 </file>
 
-<file path=ppt/slides/slide12.xml><?xml version="1.0" encoding="utf-8"?>
+<file path=ppt/slides/slide13.xml><?xml version="1.0" encoding="utf-8"?>
 <p:sld xmlns:a="http://schemas.openxmlformats.org/drawingml/2006/main" xmlns:r="http://schemas.openxmlformats.org/officeDocument/2006/relationships" xmlns:p="http://schemas.openxmlformats.org/presentationml/2006/main">
   <p:cSld>
     <p:spTree>
@@ -9763,7 +10676,7 @@
 </p:sld>
 </file>
 
-<file path=ppt/slides/slide13.xml><?xml version="1.0" encoding="utf-8"?>
+<file path=ppt/slides/slide14.xml><?xml version="1.0" encoding="utf-8"?>
 <p:sld xmlns:a="http://schemas.openxmlformats.org/drawingml/2006/main" xmlns:r="http://schemas.openxmlformats.org/officeDocument/2006/relationships" xmlns:p="http://schemas.openxmlformats.org/presentationml/2006/main">
   <p:cSld>
     <p:spTree>
@@ -10642,173 +11555,6 @@
 </p:sld>
 </file>
 
-<file path=ppt/slides/slide14.xml><?xml version="1.0" encoding="utf-8"?>
-<p:sld xmlns:a="http://schemas.openxmlformats.org/drawingml/2006/main" xmlns:r="http://schemas.openxmlformats.org/officeDocument/2006/relationships" xmlns:p="http://schemas.openxmlformats.org/presentationml/2006/main">
-  <p:cSld>
-    <p:spTree>
-      <p:nvGrpSpPr>
-        <p:cNvPr id="1" name=""/>
-        <p:cNvGrpSpPr/>
-        <p:nvPr/>
-      </p:nvGrpSpPr>
-      <p:grpSpPr>
-        <a:xfrm>
-          <a:off x="0" y="0"/>
-          <a:ext cx="0" cy="0"/>
-          <a:chOff x="0" y="0"/>
-          <a:chExt cx="0" cy="0"/>
-        </a:xfrm>
-      </p:grpSpPr>
-      <p:sp>
-        <p:nvSpPr>
-          <p:cNvPr id="2" name="Title 1">
-            <a:extLst>
-              <a:ext uri="{FF2B5EF4-FFF2-40B4-BE49-F238E27FC236}">
-                <a16:creationId xmlns:a16="http://schemas.microsoft.com/office/drawing/2014/main" id="{E46B97AC-83E7-A7EE-D58F-6E509535D54A}"/>
-              </a:ext>
-            </a:extLst>
-          </p:cNvPr>
-          <p:cNvSpPr>
-            <a:spLocks noGrp="1"/>
-          </p:cNvSpPr>
-          <p:nvPr>
-            <p:ph type="title"/>
-          </p:nvPr>
-        </p:nvSpPr>
-        <p:spPr/>
-        <p:txBody>
-          <a:bodyPr>
-            <a:normAutofit/>
-          </a:bodyPr>
-          <a:lstStyle/>
-          <a:p>
-            <a:r>
-              <a:rPr lang="en-CA" sz="6000" dirty="0"/>
-              <a:t>Recap</a:t>
-            </a:r>
-          </a:p>
-        </p:txBody>
-      </p:sp>
-      <p:sp>
-        <p:nvSpPr>
-          <p:cNvPr id="3" name="Content Placeholder 2">
-            <a:extLst>
-              <a:ext uri="{FF2B5EF4-FFF2-40B4-BE49-F238E27FC236}">
-                <a16:creationId xmlns:a16="http://schemas.microsoft.com/office/drawing/2014/main" id="{1FC9ADA7-C2BE-4A29-1C86-09A11CE85ADE}"/>
-              </a:ext>
-            </a:extLst>
-          </p:cNvPr>
-          <p:cNvSpPr>
-            <a:spLocks noGrp="1"/>
-          </p:cNvSpPr>
-          <p:nvPr>
-            <p:ph idx="1"/>
-          </p:nvPr>
-        </p:nvSpPr>
-        <p:spPr>
-          <a:xfrm>
-            <a:off x="1097280" y="2038524"/>
-            <a:ext cx="10058400" cy="3830569"/>
-          </a:xfrm>
-        </p:spPr>
-        <p:txBody>
-          <a:bodyPr/>
-          <a:lstStyle/>
-          <a:p>
-            <a:pPr>
-              <a:buFont typeface="Wingdings" panose="05000000000000000000" pitchFamily="2" charset="2"/>
-              <a:buChar char="§"/>
-            </a:pPr>
-            <a:r>
-              <a:rPr lang="en-CA" dirty="0"/>
-              <a:t> Computational pipelines and analysis scripts are not guaranteed to work</a:t>
-            </a:r>
-          </a:p>
-          <a:p>
-            <a:pPr lvl="1">
-              <a:buFont typeface="Wingdings" panose="05000000000000000000" pitchFamily="2" charset="2"/>
-              <a:buChar char="§"/>
-            </a:pPr>
-            <a:r>
-              <a:rPr lang="en-CA" dirty="0"/>
-              <a:t>Issue of reproducibility</a:t>
-            </a:r>
-          </a:p>
-          <a:p>
-            <a:pPr>
-              <a:buFont typeface="Wingdings" panose="05000000000000000000" pitchFamily="2" charset="2"/>
-              <a:buChar char="§"/>
-            </a:pPr>
-            <a:r>
-              <a:rPr lang="en-CA" dirty="0"/>
-              <a:t> Docker helps define specific software dependencies to run code in</a:t>
-            </a:r>
-          </a:p>
-          <a:p>
-            <a:pPr lvl="1">
-              <a:buFont typeface="Wingdings" panose="05000000000000000000" pitchFamily="2" charset="2"/>
-              <a:buChar char="§"/>
-            </a:pPr>
-            <a:r>
-              <a:rPr lang="en-CA" dirty="0"/>
-              <a:t>If results and expected results don’t align: most likely not a software issue</a:t>
-            </a:r>
-          </a:p>
-          <a:p>
-            <a:pPr>
-              <a:buFont typeface="Wingdings" panose="05000000000000000000" pitchFamily="2" charset="2"/>
-              <a:buChar char="§"/>
-            </a:pPr>
-            <a:r>
-              <a:rPr lang="en-CA" dirty="0"/>
-              <a:t> Docker images can be created from user specifications and public ones from </a:t>
-            </a:r>
-            <a:r>
-              <a:rPr lang="en-CA" dirty="0" err="1"/>
-              <a:t>DockerHub</a:t>
-            </a:r>
-            <a:endParaRPr lang="en-CA" dirty="0"/>
-          </a:p>
-          <a:p>
-            <a:pPr>
-              <a:buFont typeface="Wingdings" panose="05000000000000000000" pitchFamily="2" charset="2"/>
-              <a:buChar char="§"/>
-            </a:pPr>
-            <a:r>
-              <a:rPr lang="en-CA" dirty="0"/>
-              <a:t>Can combine concepts from </a:t>
-            </a:r>
-            <a:r>
-              <a:rPr lang="en-CA" dirty="0" err="1"/>
-              <a:t>Makefile</a:t>
-            </a:r>
-            <a:r>
-              <a:rPr lang="en-CA" dirty="0"/>
-              <a:t> session to streamline development</a:t>
-            </a:r>
-          </a:p>
-          <a:p>
-            <a:pPr>
-              <a:buFont typeface="Wingdings" panose="05000000000000000000" pitchFamily="2" charset="2"/>
-              <a:buChar char="§"/>
-            </a:pPr>
-            <a:endParaRPr lang="en-CA" dirty="0"/>
-          </a:p>
-        </p:txBody>
-      </p:sp>
-    </p:spTree>
-    <p:extLst>
-      <p:ext uri="{BB962C8B-B14F-4D97-AF65-F5344CB8AC3E}">
-        <p14:creationId xmlns:p14="http://schemas.microsoft.com/office/powerpoint/2010/main" val="2742997309"/>
-      </p:ext>
-    </p:extLst>
-  </p:cSld>
-  <p:clrMapOvr>
-    <a:masterClrMapping/>
-  </p:clrMapOvr>
-</p:sld>
-</file>
-
 <file path=ppt/slides/slide15.xml><?xml version="1.0" encoding="utf-8"?>
 <p:sld xmlns:a="http://schemas.openxmlformats.org/drawingml/2006/main" xmlns:r="http://schemas.openxmlformats.org/officeDocument/2006/relationships" xmlns:p="http://schemas.openxmlformats.org/presentationml/2006/main">
   <p:cSld>
@@ -10831,6 +11577,173 @@
           <p:cNvPr id="2" name="Title 1">
             <a:extLst>
               <a:ext uri="{FF2B5EF4-FFF2-40B4-BE49-F238E27FC236}">
+                <a16:creationId xmlns:a16="http://schemas.microsoft.com/office/drawing/2014/main" id="{E46B97AC-83E7-A7EE-D58F-6E509535D54A}"/>
+              </a:ext>
+            </a:extLst>
+          </p:cNvPr>
+          <p:cNvSpPr>
+            <a:spLocks noGrp="1"/>
+          </p:cNvSpPr>
+          <p:nvPr>
+            <p:ph type="title"/>
+          </p:nvPr>
+        </p:nvSpPr>
+        <p:spPr/>
+        <p:txBody>
+          <a:bodyPr>
+            <a:normAutofit/>
+          </a:bodyPr>
+          <a:lstStyle/>
+          <a:p>
+            <a:r>
+              <a:rPr lang="en-CA" sz="6000" dirty="0"/>
+              <a:t>Recap</a:t>
+            </a:r>
+          </a:p>
+        </p:txBody>
+      </p:sp>
+      <p:sp>
+        <p:nvSpPr>
+          <p:cNvPr id="3" name="Content Placeholder 2">
+            <a:extLst>
+              <a:ext uri="{FF2B5EF4-FFF2-40B4-BE49-F238E27FC236}">
+                <a16:creationId xmlns:a16="http://schemas.microsoft.com/office/drawing/2014/main" id="{1FC9ADA7-C2BE-4A29-1C86-09A11CE85ADE}"/>
+              </a:ext>
+            </a:extLst>
+          </p:cNvPr>
+          <p:cNvSpPr>
+            <a:spLocks noGrp="1"/>
+          </p:cNvSpPr>
+          <p:nvPr>
+            <p:ph idx="1"/>
+          </p:nvPr>
+        </p:nvSpPr>
+        <p:spPr>
+          <a:xfrm>
+            <a:off x="1097280" y="2038524"/>
+            <a:ext cx="10058400" cy="3830569"/>
+          </a:xfrm>
+        </p:spPr>
+        <p:txBody>
+          <a:bodyPr/>
+          <a:lstStyle/>
+          <a:p>
+            <a:pPr>
+              <a:buFont typeface="Wingdings" panose="05000000000000000000" pitchFamily="2" charset="2"/>
+              <a:buChar char="§"/>
+            </a:pPr>
+            <a:r>
+              <a:rPr lang="en-CA" dirty="0"/>
+              <a:t> Computational pipelines and analysis scripts are not guaranteed to work</a:t>
+            </a:r>
+          </a:p>
+          <a:p>
+            <a:pPr lvl="1">
+              <a:buFont typeface="Wingdings" panose="05000000000000000000" pitchFamily="2" charset="2"/>
+              <a:buChar char="§"/>
+            </a:pPr>
+            <a:r>
+              <a:rPr lang="en-CA" dirty="0"/>
+              <a:t>Issue of reproducibility</a:t>
+            </a:r>
+          </a:p>
+          <a:p>
+            <a:pPr>
+              <a:buFont typeface="Wingdings" panose="05000000000000000000" pitchFamily="2" charset="2"/>
+              <a:buChar char="§"/>
+            </a:pPr>
+            <a:r>
+              <a:rPr lang="en-CA" dirty="0"/>
+              <a:t> Docker helps define specific software dependencies to run code in</a:t>
+            </a:r>
+          </a:p>
+          <a:p>
+            <a:pPr lvl="1">
+              <a:buFont typeface="Wingdings" panose="05000000000000000000" pitchFamily="2" charset="2"/>
+              <a:buChar char="§"/>
+            </a:pPr>
+            <a:r>
+              <a:rPr lang="en-CA" dirty="0"/>
+              <a:t>If results and expected results don’t align: most likely not a software issue</a:t>
+            </a:r>
+          </a:p>
+          <a:p>
+            <a:pPr>
+              <a:buFont typeface="Wingdings" panose="05000000000000000000" pitchFamily="2" charset="2"/>
+              <a:buChar char="§"/>
+            </a:pPr>
+            <a:r>
+              <a:rPr lang="en-CA" dirty="0"/>
+              <a:t> Docker images can be created from user specifications and public ones from </a:t>
+            </a:r>
+            <a:r>
+              <a:rPr lang="en-CA" dirty="0" err="1"/>
+              <a:t>DockerHub</a:t>
+            </a:r>
+            <a:endParaRPr lang="en-CA" dirty="0"/>
+          </a:p>
+          <a:p>
+            <a:pPr>
+              <a:buFont typeface="Wingdings" panose="05000000000000000000" pitchFamily="2" charset="2"/>
+              <a:buChar char="§"/>
+            </a:pPr>
+            <a:r>
+              <a:rPr lang="en-CA" dirty="0"/>
+              <a:t>Can combine concepts from </a:t>
+            </a:r>
+            <a:r>
+              <a:rPr lang="en-CA" dirty="0" err="1"/>
+              <a:t>Makefile</a:t>
+            </a:r>
+            <a:r>
+              <a:rPr lang="en-CA" dirty="0"/>
+              <a:t> session to streamline development</a:t>
+            </a:r>
+          </a:p>
+          <a:p>
+            <a:pPr>
+              <a:buFont typeface="Wingdings" panose="05000000000000000000" pitchFamily="2" charset="2"/>
+              <a:buChar char="§"/>
+            </a:pPr>
+            <a:endParaRPr lang="en-CA" dirty="0"/>
+          </a:p>
+        </p:txBody>
+      </p:sp>
+    </p:spTree>
+    <p:extLst>
+      <p:ext uri="{BB962C8B-B14F-4D97-AF65-F5344CB8AC3E}">
+        <p14:creationId xmlns:p14="http://schemas.microsoft.com/office/powerpoint/2010/main" val="2742997309"/>
+      </p:ext>
+    </p:extLst>
+  </p:cSld>
+  <p:clrMapOvr>
+    <a:masterClrMapping/>
+  </p:clrMapOvr>
+</p:sld>
+</file>
+
+<file path=ppt/slides/slide16.xml><?xml version="1.0" encoding="utf-8"?>
+<p:sld xmlns:a="http://schemas.openxmlformats.org/drawingml/2006/main" xmlns:r="http://schemas.openxmlformats.org/officeDocument/2006/relationships" xmlns:p="http://schemas.openxmlformats.org/presentationml/2006/main">
+  <p:cSld>
+    <p:spTree>
+      <p:nvGrpSpPr>
+        <p:cNvPr id="1" name=""/>
+        <p:cNvGrpSpPr/>
+        <p:nvPr/>
+      </p:nvGrpSpPr>
+      <p:grpSpPr>
+        <a:xfrm>
+          <a:off x="0" y="0"/>
+          <a:ext cx="0" cy="0"/>
+          <a:chOff x="0" y="0"/>
+          <a:chExt cx="0" cy="0"/>
+        </a:xfrm>
+      </p:grpSpPr>
+      <p:sp>
+        <p:nvSpPr>
+          <p:cNvPr id="2" name="Title 1">
+            <a:extLst>
+              <a:ext uri="{FF2B5EF4-FFF2-40B4-BE49-F238E27FC236}">
                 <a16:creationId xmlns:a16="http://schemas.microsoft.com/office/drawing/2014/main" id="{DC258D96-03B1-3892-AFDC-0451E049AE59}"/>
               </a:ext>
             </a:extLst>
@@ -10943,7 +11856,7 @@
 </p:sld>
 </file>
 
-<file path=ppt/slides/slide16.xml><?xml version="1.0" encoding="utf-8"?>
+<file path=ppt/slides/slide17.xml><?xml version="1.0" encoding="utf-8"?>
 <p:sld xmlns:a="http://schemas.openxmlformats.org/drawingml/2006/main" xmlns:r="http://schemas.openxmlformats.org/officeDocument/2006/relationships" xmlns:p="http://schemas.openxmlformats.org/presentationml/2006/main">
   <p:cSld>
     <p:spTree>

</xml_diff>